<commit_message>
Added LCD player example. Improved message flow documentation.
</commit_message>
<xml_diff>
--- a/media/photo/YX5300 Diagrams.pptx
+++ b/media/photo/YX5300 Diagrams.pptx
@@ -104,6 +104,11 @@
       </a:defRPr>
     </a:lvl9pPr>
   </p:defaultTextStyle>
+  <p:extLst>
+    <p:ext uri="{EFAFB233-063F-42B5-8137-9DF3F51BA10A}">
+      <p15:sldGuideLst xmlns:p15="http://schemas.microsoft.com/office/powerpoint/2012/main"/>
+    </p:ext>
+  </p:extLst>
 </p:presentation>
 </file>
 
@@ -256,7 +261,7 @@
           <a:p>
             <a:fld id="{30E136DB-CF8E-4657-B77B-C117B505A95A}" type="datetimeFigureOut">
               <a:rPr lang="en-AU" smtClean="0"/>
-              <a:t>23/07/2018</a:t>
+              <a:t>14/04/2019</a:t>
             </a:fld>
             <a:endParaRPr lang="en-AU"/>
           </a:p>
@@ -456,7 +461,7 @@
           <a:p>
             <a:fld id="{30E136DB-CF8E-4657-B77B-C117B505A95A}" type="datetimeFigureOut">
               <a:rPr lang="en-AU" smtClean="0"/>
-              <a:t>23/07/2018</a:t>
+              <a:t>14/04/2019</a:t>
             </a:fld>
             <a:endParaRPr lang="en-AU"/>
           </a:p>
@@ -666,7 +671,7 @@
           <a:p>
             <a:fld id="{30E136DB-CF8E-4657-B77B-C117B505A95A}" type="datetimeFigureOut">
               <a:rPr lang="en-AU" smtClean="0"/>
-              <a:t>23/07/2018</a:t>
+              <a:t>14/04/2019</a:t>
             </a:fld>
             <a:endParaRPr lang="en-AU"/>
           </a:p>
@@ -866,7 +871,7 @@
           <a:p>
             <a:fld id="{30E136DB-CF8E-4657-B77B-C117B505A95A}" type="datetimeFigureOut">
               <a:rPr lang="en-AU" smtClean="0"/>
-              <a:t>23/07/2018</a:t>
+              <a:t>14/04/2019</a:t>
             </a:fld>
             <a:endParaRPr lang="en-AU"/>
           </a:p>
@@ -1142,7 +1147,7 @@
           <a:p>
             <a:fld id="{30E136DB-CF8E-4657-B77B-C117B505A95A}" type="datetimeFigureOut">
               <a:rPr lang="en-AU" smtClean="0"/>
-              <a:t>23/07/2018</a:t>
+              <a:t>14/04/2019</a:t>
             </a:fld>
             <a:endParaRPr lang="en-AU"/>
           </a:p>
@@ -1410,7 +1415,7 @@
           <a:p>
             <a:fld id="{30E136DB-CF8E-4657-B77B-C117B505A95A}" type="datetimeFigureOut">
               <a:rPr lang="en-AU" smtClean="0"/>
-              <a:t>23/07/2018</a:t>
+              <a:t>14/04/2019</a:t>
             </a:fld>
             <a:endParaRPr lang="en-AU"/>
           </a:p>
@@ -1825,7 +1830,7 @@
           <a:p>
             <a:fld id="{30E136DB-CF8E-4657-B77B-C117B505A95A}" type="datetimeFigureOut">
               <a:rPr lang="en-AU" smtClean="0"/>
-              <a:t>23/07/2018</a:t>
+              <a:t>14/04/2019</a:t>
             </a:fld>
             <a:endParaRPr lang="en-AU"/>
           </a:p>
@@ -1967,7 +1972,7 @@
           <a:p>
             <a:fld id="{30E136DB-CF8E-4657-B77B-C117B505A95A}" type="datetimeFigureOut">
               <a:rPr lang="en-AU" smtClean="0"/>
-              <a:t>23/07/2018</a:t>
+              <a:t>14/04/2019</a:t>
             </a:fld>
             <a:endParaRPr lang="en-AU"/>
           </a:p>
@@ -2080,7 +2085,7 @@
           <a:p>
             <a:fld id="{30E136DB-CF8E-4657-B77B-C117B505A95A}" type="datetimeFigureOut">
               <a:rPr lang="en-AU" smtClean="0"/>
-              <a:t>23/07/2018</a:t>
+              <a:t>14/04/2019</a:t>
             </a:fld>
             <a:endParaRPr lang="en-AU"/>
           </a:p>
@@ -2393,7 +2398,7 @@
           <a:p>
             <a:fld id="{30E136DB-CF8E-4657-B77B-C117B505A95A}" type="datetimeFigureOut">
               <a:rPr lang="en-AU" smtClean="0"/>
-              <a:t>23/07/2018</a:t>
+              <a:t>14/04/2019</a:t>
             </a:fld>
             <a:endParaRPr lang="en-AU"/>
           </a:p>
@@ -2682,7 +2687,7 @@
           <a:p>
             <a:fld id="{30E136DB-CF8E-4657-B77B-C117B505A95A}" type="datetimeFigureOut">
               <a:rPr lang="en-AU" smtClean="0"/>
-              <a:t>23/07/2018</a:t>
+              <a:t>14/04/2019</a:t>
             </a:fld>
             <a:endParaRPr lang="en-AU"/>
           </a:p>
@@ -2925,7 +2930,7 @@
           <a:p>
             <a:fld id="{30E136DB-CF8E-4657-B77B-C117B505A95A}" type="datetimeFigureOut">
               <a:rPr lang="en-AU" smtClean="0"/>
-              <a:t>23/07/2018</a:t>
+              <a:t>14/04/2019</a:t>
             </a:fld>
             <a:endParaRPr lang="en-AU"/>
           </a:p>
@@ -4071,6 +4076,733 @@
           </p:txBody>
         </p:sp>
       </p:grpSp>
+      <p:grpSp>
+        <p:nvGrpSpPr>
+          <p:cNvPr id="2" name="Group 1">
+            <a:extLst>
+              <a:ext uri="{FF2B5EF4-FFF2-40B4-BE49-F238E27FC236}">
+                <a16:creationId xmlns:a16="http://schemas.microsoft.com/office/drawing/2014/main" id="{E51AAB66-0570-4F74-A3FA-E5EDCAF37473}"/>
+              </a:ext>
+            </a:extLst>
+          </p:cNvPr>
+          <p:cNvGrpSpPr/>
+          <p:nvPr/>
+        </p:nvGrpSpPr>
+        <p:grpSpPr>
+          <a:xfrm>
+            <a:off x="771479" y="1872000"/>
+            <a:ext cx="6148208" cy="261610"/>
+            <a:chOff x="771479" y="1872000"/>
+            <a:chExt cx="6148208" cy="261610"/>
+          </a:xfrm>
+        </p:grpSpPr>
+        <p:sp>
+          <p:nvSpPr>
+            <p:cNvPr id="18" name="Rectangle 17">
+              <a:extLst>
+                <a:ext uri="{FF2B5EF4-FFF2-40B4-BE49-F238E27FC236}">
+                  <a16:creationId xmlns:a16="http://schemas.microsoft.com/office/drawing/2014/main" id="{3E9AF433-AB16-40C6-946B-696104D80457}"/>
+                </a:ext>
+              </a:extLst>
+            </p:cNvPr>
+            <p:cNvSpPr/>
+            <p:nvPr/>
+          </p:nvSpPr>
+          <p:spPr>
+            <a:xfrm>
+              <a:off x="771479" y="1872000"/>
+              <a:ext cx="612000" cy="261610"/>
+            </a:xfrm>
+            <a:prstGeom prst="rect">
+              <a:avLst/>
+            </a:prstGeom>
+            <a:solidFill>
+              <a:schemeClr val="accent1"/>
+            </a:solidFill>
+            <a:ln>
+              <a:solidFill>
+                <a:schemeClr val="tx1"/>
+              </a:solidFill>
+            </a:ln>
+          </p:spPr>
+          <p:style>
+            <a:lnRef idx="2">
+              <a:schemeClr val="accent1">
+                <a:shade val="50000"/>
+              </a:schemeClr>
+            </a:lnRef>
+            <a:fillRef idx="1">
+              <a:schemeClr val="accent1"/>
+            </a:fillRef>
+            <a:effectRef idx="0">
+              <a:schemeClr val="accent1"/>
+            </a:effectRef>
+            <a:fontRef idx="minor">
+              <a:schemeClr val="lt1"/>
+            </a:fontRef>
+          </p:style>
+          <p:txBody>
+            <a:bodyPr rtlCol="0" anchor="ctr">
+              <a:spAutoFit/>
+            </a:bodyPr>
+            <a:lstStyle/>
+            <a:p>
+              <a:pPr algn="ctr"/>
+              <a:r>
+                <a:rPr lang="en-AU" sz="1100" dirty="0">
+                  <a:solidFill>
+                    <a:schemeClr val="bg1"/>
+                  </a:solidFill>
+                </a:rPr>
+                <a:t>Start</a:t>
+              </a:r>
+            </a:p>
+          </p:txBody>
+        </p:sp>
+        <p:sp>
+          <p:nvSpPr>
+            <p:cNvPr id="19" name="Rectangle 18">
+              <a:extLst>
+                <a:ext uri="{FF2B5EF4-FFF2-40B4-BE49-F238E27FC236}">
+                  <a16:creationId xmlns:a16="http://schemas.microsoft.com/office/drawing/2014/main" id="{B9874E45-FB11-41CC-A243-A37BB4F9E4B5}"/>
+                </a:ext>
+              </a:extLst>
+            </p:cNvPr>
+            <p:cNvSpPr/>
+            <p:nvPr/>
+          </p:nvSpPr>
+          <p:spPr>
+            <a:xfrm>
+              <a:off x="1387335" y="1872000"/>
+              <a:ext cx="648000" cy="261610"/>
+            </a:xfrm>
+            <a:prstGeom prst="rect">
+              <a:avLst/>
+            </a:prstGeom>
+            <a:solidFill>
+              <a:schemeClr val="accent1">
+                <a:lumMod val="20000"/>
+                <a:lumOff val="80000"/>
+              </a:schemeClr>
+            </a:solidFill>
+            <a:ln>
+              <a:solidFill>
+                <a:schemeClr val="tx1"/>
+              </a:solidFill>
+            </a:ln>
+          </p:spPr>
+          <p:style>
+            <a:lnRef idx="2">
+              <a:schemeClr val="accent1">
+                <a:shade val="50000"/>
+              </a:schemeClr>
+            </a:lnRef>
+            <a:fillRef idx="1">
+              <a:schemeClr val="accent1"/>
+            </a:fillRef>
+            <a:effectRef idx="0">
+              <a:schemeClr val="accent1"/>
+            </a:effectRef>
+            <a:fontRef idx="minor">
+              <a:schemeClr val="lt1"/>
+            </a:fontRef>
+          </p:style>
+          <p:txBody>
+            <a:bodyPr rtlCol="0" anchor="ctr">
+              <a:spAutoFit/>
+            </a:bodyPr>
+            <a:lstStyle/>
+            <a:p>
+              <a:pPr algn="ctr"/>
+              <a:r>
+                <a:rPr lang="en-AU" sz="1100" dirty="0">
+                  <a:solidFill>
+                    <a:schemeClr val="tx1"/>
+                  </a:solidFill>
+                </a:rPr>
+                <a:t>Version</a:t>
+              </a:r>
+            </a:p>
+          </p:txBody>
+        </p:sp>
+        <p:sp>
+          <p:nvSpPr>
+            <p:cNvPr id="20" name="Rectangle 19">
+              <a:extLst>
+                <a:ext uri="{FF2B5EF4-FFF2-40B4-BE49-F238E27FC236}">
+                  <a16:creationId xmlns:a16="http://schemas.microsoft.com/office/drawing/2014/main" id="{5B094F17-7762-43E5-9D96-F31FD90644C8}"/>
+                </a:ext>
+              </a:extLst>
+            </p:cNvPr>
+            <p:cNvSpPr/>
+            <p:nvPr/>
+          </p:nvSpPr>
+          <p:spPr>
+            <a:xfrm>
+              <a:off x="2028562" y="1872000"/>
+              <a:ext cx="612000" cy="261610"/>
+            </a:xfrm>
+            <a:prstGeom prst="rect">
+              <a:avLst/>
+            </a:prstGeom>
+            <a:solidFill>
+              <a:schemeClr val="accent1">
+                <a:lumMod val="20000"/>
+                <a:lumOff val="80000"/>
+              </a:schemeClr>
+            </a:solidFill>
+            <a:ln>
+              <a:solidFill>
+                <a:schemeClr val="tx1"/>
+              </a:solidFill>
+            </a:ln>
+          </p:spPr>
+          <p:style>
+            <a:lnRef idx="2">
+              <a:schemeClr val="accent1">
+                <a:shade val="50000"/>
+              </a:schemeClr>
+            </a:lnRef>
+            <a:fillRef idx="1">
+              <a:schemeClr val="accent1"/>
+            </a:fillRef>
+            <a:effectRef idx="0">
+              <a:schemeClr val="accent1"/>
+            </a:effectRef>
+            <a:fontRef idx="minor">
+              <a:schemeClr val="lt1"/>
+            </a:fontRef>
+          </p:style>
+          <p:txBody>
+            <a:bodyPr rtlCol="0" anchor="ctr">
+              <a:spAutoFit/>
+            </a:bodyPr>
+            <a:lstStyle/>
+            <a:p>
+              <a:pPr algn="ctr"/>
+              <a:r>
+                <a:rPr lang="en-AU" sz="1100" dirty="0">
+                  <a:solidFill>
+                    <a:schemeClr val="tx1"/>
+                  </a:solidFill>
+                </a:rPr>
+                <a:t>Length</a:t>
+              </a:r>
+            </a:p>
+          </p:txBody>
+        </p:sp>
+        <p:sp>
+          <p:nvSpPr>
+            <p:cNvPr id="21" name="Rectangle 20">
+              <a:extLst>
+                <a:ext uri="{FF2B5EF4-FFF2-40B4-BE49-F238E27FC236}">
+                  <a16:creationId xmlns:a16="http://schemas.microsoft.com/office/drawing/2014/main" id="{23435303-4A0A-4560-8A53-08D22367F3D2}"/>
+                </a:ext>
+              </a:extLst>
+            </p:cNvPr>
+            <p:cNvSpPr/>
+            <p:nvPr/>
+          </p:nvSpPr>
+          <p:spPr>
+            <a:xfrm>
+              <a:off x="2633787" y="1872000"/>
+              <a:ext cx="612000" cy="261610"/>
+            </a:xfrm>
+            <a:prstGeom prst="rect">
+              <a:avLst/>
+            </a:prstGeom>
+            <a:solidFill>
+              <a:schemeClr val="accent1">
+                <a:lumMod val="20000"/>
+                <a:lumOff val="80000"/>
+              </a:schemeClr>
+            </a:solidFill>
+            <a:ln>
+              <a:solidFill>
+                <a:schemeClr val="tx1"/>
+              </a:solidFill>
+            </a:ln>
+          </p:spPr>
+          <p:style>
+            <a:lnRef idx="2">
+              <a:schemeClr val="accent1">
+                <a:shade val="50000"/>
+              </a:schemeClr>
+            </a:lnRef>
+            <a:fillRef idx="1">
+              <a:schemeClr val="accent1"/>
+            </a:fillRef>
+            <a:effectRef idx="0">
+              <a:schemeClr val="accent1"/>
+            </a:effectRef>
+            <a:fontRef idx="minor">
+              <a:schemeClr val="lt1"/>
+            </a:fontRef>
+          </p:style>
+          <p:txBody>
+            <a:bodyPr rtlCol="0" anchor="ctr">
+              <a:spAutoFit/>
+            </a:bodyPr>
+            <a:lstStyle/>
+            <a:p>
+              <a:pPr algn="ctr"/>
+              <a:r>
+                <a:rPr lang="en-AU" sz="1100" dirty="0" err="1">
+                  <a:solidFill>
+                    <a:schemeClr val="tx1"/>
+                  </a:solidFill>
+                </a:rPr>
+                <a:t>Cmd</a:t>
+              </a:r>
+              <a:endParaRPr lang="en-AU" sz="1100" dirty="0">
+                <a:solidFill>
+                  <a:schemeClr val="tx1"/>
+                </a:solidFill>
+              </a:endParaRPr>
+            </a:p>
+          </p:txBody>
+        </p:sp>
+        <p:sp>
+          <p:nvSpPr>
+            <p:cNvPr id="22" name="Rectangle 21">
+              <a:extLst>
+                <a:ext uri="{FF2B5EF4-FFF2-40B4-BE49-F238E27FC236}">
+                  <a16:creationId xmlns:a16="http://schemas.microsoft.com/office/drawing/2014/main" id="{AFB0093E-858C-4E2F-9A7E-AF8185EFF4E6}"/>
+                </a:ext>
+              </a:extLst>
+            </p:cNvPr>
+            <p:cNvSpPr/>
+            <p:nvPr/>
+          </p:nvSpPr>
+          <p:spPr>
+            <a:xfrm>
+              <a:off x="3239014" y="1872000"/>
+              <a:ext cx="612000" cy="261610"/>
+            </a:xfrm>
+            <a:prstGeom prst="rect">
+              <a:avLst/>
+            </a:prstGeom>
+            <a:solidFill>
+              <a:schemeClr val="accent1">
+                <a:lumMod val="20000"/>
+                <a:lumOff val="80000"/>
+              </a:schemeClr>
+            </a:solidFill>
+            <a:ln>
+              <a:solidFill>
+                <a:schemeClr val="tx1"/>
+              </a:solidFill>
+            </a:ln>
+          </p:spPr>
+          <p:style>
+            <a:lnRef idx="2">
+              <a:schemeClr val="accent1">
+                <a:shade val="50000"/>
+              </a:schemeClr>
+            </a:lnRef>
+            <a:fillRef idx="1">
+              <a:schemeClr val="accent1"/>
+            </a:fillRef>
+            <a:effectRef idx="0">
+              <a:schemeClr val="accent1"/>
+            </a:effectRef>
+            <a:fontRef idx="minor">
+              <a:schemeClr val="lt1"/>
+            </a:fontRef>
+          </p:style>
+          <p:txBody>
+            <a:bodyPr rtlCol="0" anchor="ctr">
+              <a:spAutoFit/>
+            </a:bodyPr>
+            <a:lstStyle/>
+            <a:p>
+              <a:pPr algn="ctr"/>
+              <a:r>
+                <a:rPr lang="en-AU" sz="1100" dirty="0" err="1">
+                  <a:solidFill>
+                    <a:schemeClr val="tx1"/>
+                  </a:solidFill>
+                </a:rPr>
+                <a:t>Fback</a:t>
+              </a:r>
+              <a:endParaRPr lang="en-AU" sz="1100" dirty="0">
+                <a:solidFill>
+                  <a:schemeClr val="tx1"/>
+                </a:solidFill>
+              </a:endParaRPr>
+            </a:p>
+          </p:txBody>
+        </p:sp>
+        <p:sp>
+          <p:nvSpPr>
+            <p:cNvPr id="23" name="Rectangle 22">
+              <a:extLst>
+                <a:ext uri="{FF2B5EF4-FFF2-40B4-BE49-F238E27FC236}">
+                  <a16:creationId xmlns:a16="http://schemas.microsoft.com/office/drawing/2014/main" id="{96264173-5ACC-4E7A-A908-93CC83F750DD}"/>
+                </a:ext>
+              </a:extLst>
+            </p:cNvPr>
+            <p:cNvSpPr/>
+            <p:nvPr/>
+          </p:nvSpPr>
+          <p:spPr>
+            <a:xfrm>
+              <a:off x="3844234" y="1872000"/>
+              <a:ext cx="612000" cy="261610"/>
+            </a:xfrm>
+            <a:prstGeom prst="rect">
+              <a:avLst/>
+            </a:prstGeom>
+            <a:solidFill>
+              <a:schemeClr val="accent1">
+                <a:lumMod val="20000"/>
+                <a:lumOff val="80000"/>
+              </a:schemeClr>
+            </a:solidFill>
+            <a:ln>
+              <a:solidFill>
+                <a:schemeClr val="tx1"/>
+              </a:solidFill>
+            </a:ln>
+          </p:spPr>
+          <p:style>
+            <a:lnRef idx="2">
+              <a:schemeClr val="accent1">
+                <a:shade val="50000"/>
+              </a:schemeClr>
+            </a:lnRef>
+            <a:fillRef idx="1">
+              <a:schemeClr val="accent1"/>
+            </a:fillRef>
+            <a:effectRef idx="0">
+              <a:schemeClr val="accent1"/>
+            </a:effectRef>
+            <a:fontRef idx="minor">
+              <a:schemeClr val="lt1"/>
+            </a:fontRef>
+          </p:style>
+          <p:txBody>
+            <a:bodyPr rtlCol="0" anchor="ctr">
+              <a:spAutoFit/>
+            </a:bodyPr>
+            <a:lstStyle/>
+            <a:p>
+              <a:pPr algn="ctr"/>
+              <a:r>
+                <a:rPr lang="en-AU" sz="1100" dirty="0" err="1">
+                  <a:solidFill>
+                    <a:schemeClr val="tx1"/>
+                  </a:solidFill>
+                </a:rPr>
+                <a:t>DataHi</a:t>
+              </a:r>
+              <a:endParaRPr lang="en-AU" sz="1100" dirty="0">
+                <a:solidFill>
+                  <a:schemeClr val="tx1"/>
+                </a:solidFill>
+              </a:endParaRPr>
+            </a:p>
+          </p:txBody>
+        </p:sp>
+        <p:sp>
+          <p:nvSpPr>
+            <p:cNvPr id="24" name="Rectangle 23">
+              <a:extLst>
+                <a:ext uri="{FF2B5EF4-FFF2-40B4-BE49-F238E27FC236}">
+                  <a16:creationId xmlns:a16="http://schemas.microsoft.com/office/drawing/2014/main" id="{E1E9CED2-C1FF-4D8C-BBD9-5D871EEF4AB9}"/>
+                </a:ext>
+              </a:extLst>
+            </p:cNvPr>
+            <p:cNvSpPr/>
+            <p:nvPr/>
+          </p:nvSpPr>
+          <p:spPr>
+            <a:xfrm>
+              <a:off x="4460097" y="1872000"/>
+              <a:ext cx="612000" cy="261610"/>
+            </a:xfrm>
+            <a:prstGeom prst="rect">
+              <a:avLst/>
+            </a:prstGeom>
+            <a:solidFill>
+              <a:schemeClr val="accent1">
+                <a:lumMod val="20000"/>
+                <a:lumOff val="80000"/>
+              </a:schemeClr>
+            </a:solidFill>
+            <a:ln>
+              <a:solidFill>
+                <a:schemeClr val="tx1"/>
+              </a:solidFill>
+            </a:ln>
+          </p:spPr>
+          <p:style>
+            <a:lnRef idx="2">
+              <a:schemeClr val="accent1">
+                <a:shade val="50000"/>
+              </a:schemeClr>
+            </a:lnRef>
+            <a:fillRef idx="1">
+              <a:schemeClr val="accent1"/>
+            </a:fillRef>
+            <a:effectRef idx="0">
+              <a:schemeClr val="accent1"/>
+            </a:effectRef>
+            <a:fontRef idx="minor">
+              <a:schemeClr val="lt1"/>
+            </a:fontRef>
+          </p:style>
+          <p:txBody>
+            <a:bodyPr rtlCol="0" anchor="ctr">
+              <a:spAutoFit/>
+            </a:bodyPr>
+            <a:lstStyle/>
+            <a:p>
+              <a:pPr algn="ctr"/>
+              <a:r>
+                <a:rPr lang="en-AU" sz="1100" dirty="0" err="1">
+                  <a:solidFill>
+                    <a:schemeClr val="tx1"/>
+                  </a:solidFill>
+                </a:rPr>
+                <a:t>DataLo</a:t>
+              </a:r>
+              <a:endParaRPr lang="en-AU" sz="1100" dirty="0">
+                <a:solidFill>
+                  <a:schemeClr val="tx1"/>
+                </a:solidFill>
+              </a:endParaRPr>
+            </a:p>
+          </p:txBody>
+        </p:sp>
+        <p:sp>
+          <p:nvSpPr>
+            <p:cNvPr id="25" name="Rectangle 24">
+              <a:extLst>
+                <a:ext uri="{FF2B5EF4-FFF2-40B4-BE49-F238E27FC236}">
+                  <a16:creationId xmlns:a16="http://schemas.microsoft.com/office/drawing/2014/main" id="{1B75B580-8F8B-4CC2-9A29-234C0FA24F9B}"/>
+                </a:ext>
+              </a:extLst>
+            </p:cNvPr>
+            <p:cNvSpPr/>
+            <p:nvPr/>
+          </p:nvSpPr>
+          <p:spPr>
+            <a:xfrm>
+              <a:off x="5073848" y="1872000"/>
+              <a:ext cx="612000" cy="261610"/>
+            </a:xfrm>
+            <a:prstGeom prst="rect">
+              <a:avLst/>
+            </a:prstGeom>
+            <a:solidFill>
+              <a:schemeClr val="accent1">
+                <a:lumMod val="60000"/>
+                <a:lumOff val="40000"/>
+              </a:schemeClr>
+            </a:solidFill>
+            <a:ln>
+              <a:solidFill>
+                <a:schemeClr val="tx1"/>
+              </a:solidFill>
+            </a:ln>
+          </p:spPr>
+          <p:style>
+            <a:lnRef idx="2">
+              <a:schemeClr val="accent1">
+                <a:shade val="50000"/>
+              </a:schemeClr>
+            </a:lnRef>
+            <a:fillRef idx="1">
+              <a:schemeClr val="accent1"/>
+            </a:fillRef>
+            <a:effectRef idx="0">
+              <a:schemeClr val="accent1"/>
+            </a:effectRef>
+            <a:fontRef idx="minor">
+              <a:schemeClr val="lt1"/>
+            </a:fontRef>
+          </p:style>
+          <p:txBody>
+            <a:bodyPr rtlCol="0" anchor="ctr">
+              <a:spAutoFit/>
+            </a:bodyPr>
+            <a:lstStyle/>
+            <a:p>
+              <a:pPr algn="ctr"/>
+              <a:r>
+                <a:rPr lang="en-AU" sz="1100" dirty="0">
+                  <a:solidFill>
+                    <a:schemeClr val="tx1"/>
+                  </a:solidFill>
+                </a:rPr>
+                <a:t>[</a:t>
+              </a:r>
+              <a:r>
+                <a:rPr lang="en-AU" sz="1100" dirty="0" err="1">
+                  <a:solidFill>
+                    <a:schemeClr val="tx1"/>
+                  </a:solidFill>
+                </a:rPr>
+                <a:t>ChkHi</a:t>
+              </a:r>
+              <a:r>
+                <a:rPr lang="en-AU" sz="1100" dirty="0">
+                  <a:solidFill>
+                    <a:schemeClr val="tx1"/>
+                  </a:solidFill>
+                </a:rPr>
+                <a:t>]</a:t>
+              </a:r>
+            </a:p>
+          </p:txBody>
+        </p:sp>
+        <p:sp>
+          <p:nvSpPr>
+            <p:cNvPr id="26" name="Rectangle 25">
+              <a:extLst>
+                <a:ext uri="{FF2B5EF4-FFF2-40B4-BE49-F238E27FC236}">
+                  <a16:creationId xmlns:a16="http://schemas.microsoft.com/office/drawing/2014/main" id="{C829F812-2FAE-45B6-A1E4-1BCC58DEEDF8}"/>
+                </a:ext>
+              </a:extLst>
+            </p:cNvPr>
+            <p:cNvSpPr/>
+            <p:nvPr/>
+          </p:nvSpPr>
+          <p:spPr>
+            <a:xfrm>
+              <a:off x="5691831" y="1872000"/>
+              <a:ext cx="612000" cy="261610"/>
+            </a:xfrm>
+            <a:prstGeom prst="rect">
+              <a:avLst/>
+            </a:prstGeom>
+            <a:solidFill>
+              <a:schemeClr val="accent1">
+                <a:lumMod val="60000"/>
+                <a:lumOff val="40000"/>
+              </a:schemeClr>
+            </a:solidFill>
+            <a:ln>
+              <a:solidFill>
+                <a:schemeClr val="tx1"/>
+              </a:solidFill>
+            </a:ln>
+          </p:spPr>
+          <p:style>
+            <a:lnRef idx="2">
+              <a:schemeClr val="accent1">
+                <a:shade val="50000"/>
+              </a:schemeClr>
+            </a:lnRef>
+            <a:fillRef idx="1">
+              <a:schemeClr val="accent1"/>
+            </a:fillRef>
+            <a:effectRef idx="0">
+              <a:schemeClr val="accent1"/>
+            </a:effectRef>
+            <a:fontRef idx="minor">
+              <a:schemeClr val="lt1"/>
+            </a:fontRef>
+          </p:style>
+          <p:txBody>
+            <a:bodyPr rtlCol="0" anchor="ctr">
+              <a:spAutoFit/>
+            </a:bodyPr>
+            <a:lstStyle/>
+            <a:p>
+              <a:pPr algn="ctr"/>
+              <a:r>
+                <a:rPr lang="en-AU" sz="1100" dirty="0">
+                  <a:solidFill>
+                    <a:schemeClr val="tx1"/>
+                  </a:solidFill>
+                </a:rPr>
+                <a:t>[</a:t>
+              </a:r>
+              <a:r>
+                <a:rPr lang="en-AU" sz="1100" dirty="0" err="1">
+                  <a:solidFill>
+                    <a:schemeClr val="tx1"/>
+                  </a:solidFill>
+                </a:rPr>
+                <a:t>ChkLo</a:t>
+              </a:r>
+              <a:r>
+                <a:rPr lang="en-AU" sz="1100" dirty="0">
+                  <a:solidFill>
+                    <a:schemeClr val="tx1"/>
+                  </a:solidFill>
+                </a:rPr>
+                <a:t>]</a:t>
+              </a:r>
+            </a:p>
+          </p:txBody>
+        </p:sp>
+        <p:sp>
+          <p:nvSpPr>
+            <p:cNvPr id="27" name="Rectangle 26">
+              <a:extLst>
+                <a:ext uri="{FF2B5EF4-FFF2-40B4-BE49-F238E27FC236}">
+                  <a16:creationId xmlns:a16="http://schemas.microsoft.com/office/drawing/2014/main" id="{D80AB84F-4840-4DD1-9BF4-E73376CF16C7}"/>
+                </a:ext>
+              </a:extLst>
+            </p:cNvPr>
+            <p:cNvSpPr/>
+            <p:nvPr/>
+          </p:nvSpPr>
+          <p:spPr>
+            <a:xfrm>
+              <a:off x="6307687" y="1872000"/>
+              <a:ext cx="612000" cy="261610"/>
+            </a:xfrm>
+            <a:prstGeom prst="rect">
+              <a:avLst/>
+            </a:prstGeom>
+            <a:solidFill>
+              <a:schemeClr val="accent1"/>
+            </a:solidFill>
+            <a:ln>
+              <a:solidFill>
+                <a:schemeClr val="tx1"/>
+              </a:solidFill>
+            </a:ln>
+          </p:spPr>
+          <p:style>
+            <a:lnRef idx="2">
+              <a:schemeClr val="accent1">
+                <a:shade val="50000"/>
+              </a:schemeClr>
+            </a:lnRef>
+            <a:fillRef idx="1">
+              <a:schemeClr val="accent1"/>
+            </a:fillRef>
+            <a:effectRef idx="0">
+              <a:schemeClr val="accent1"/>
+            </a:effectRef>
+            <a:fontRef idx="minor">
+              <a:schemeClr val="lt1"/>
+            </a:fontRef>
+          </p:style>
+          <p:txBody>
+            <a:bodyPr rtlCol="0" anchor="ctr">
+              <a:spAutoFit/>
+            </a:bodyPr>
+            <a:lstStyle/>
+            <a:p>
+              <a:pPr algn="ctr"/>
+              <a:r>
+                <a:rPr lang="en-AU" sz="1100" dirty="0">
+                  <a:solidFill>
+                    <a:schemeClr val="bg1"/>
+                  </a:solidFill>
+                </a:rPr>
+                <a:t>End</a:t>
+              </a:r>
+            </a:p>
+          </p:txBody>
+        </p:sp>
+      </p:grpSp>
     </p:spTree>
     <p:extLst>
       <p:ext uri="{BB962C8B-B14F-4D97-AF65-F5344CB8AC3E}">

</xml_diff>